<commit_message>
clarity on capability, notes
</commit_message>
<xml_diff>
--- a/MakingSecurityDecisionsLikeABoss.pptx
+++ b/MakingSecurityDecisionsLikeABoss.pptx
@@ -15332,6 +15332,34 @@
 </dgm:styleDef>
 </file>
 
+<file path=ppt/ink/ink1.xml><?xml version="1.0" encoding="utf-8"?>
+<inkml:ink xmlns:inkml="http://www.w3.org/2003/InkML">
+  <inkml:definitions>
+    <inkml:context xml:id="ctx0">
+      <inkml:inkSource xml:id="inkSrc0">
+        <inkml:traceFormat>
+          <inkml:channel name="X" type="integer" min="-2.14748E9" max="2.14748E9" units="cm"/>
+          <inkml:channel name="Y" type="integer" min="-2.14748E9" max="2.14748E9" units="cm"/>
+          <inkml:channel name="F" type="integer" max="32767" units="dev"/>
+        </inkml:traceFormat>
+        <inkml:channelProperties>
+          <inkml:channelProperty channel="X" name="resolution" value="1000" units="1/cm"/>
+          <inkml:channelProperty channel="Y" name="resolution" value="1000" units="1/cm"/>
+          <inkml:channelProperty channel="F" name="resolution" value="0" units="1/dev"/>
+        </inkml:channelProperties>
+      </inkml:inkSource>
+      <inkml:timestamp xml:id="ts0" timeString="2022-04-02T00:39:57.594"/>
+    </inkml:context>
+    <inkml:brush xml:id="br0">
+      <inkml:brushProperty name="width" value="0.1" units="cm"/>
+      <inkml:brushProperty name="height" value="0.1" units="cm"/>
+      <inkml:brushProperty name="color" value="#F6630D"/>
+    </inkml:brush>
+  </inkml:definitions>
+  <inkml:trace contextRef="#ctx0" brushRef="#br0">680 0 24575,'-2'16'0,"-21"55"0,12-26 0,-1 9 0,-2 14 0,-2 15 0,-1 4 0,2-3 0,-1 13 0,2-1 0,0 4 0,2-5 0,-1 5 0,0-1 0,1-4-439,-1 9 0,0-6 1,0-3 438,3-13 0,0-4 0,0 0 0,-3-2 0,0 0 0,1-2 66,1-7 0,2-1 0,0 0-66,-2 32 0,2-2 0,0-7 0,2 1 0,5 8 0,1 1 0,-3-10 0,0-1 0,0 2 0,-1-3 0,1-9 0,-1-2 0,-4-9 0,0-2 0,0-4 0,1-3 0,1-2 0,-1-1 494,2 0 0,1 0-494,-1 4 0,2 1 65,2 0 0,0 1-65,-2 4 0,0 0 0,2-4 0,0 0 0,-3-2 0,-1 1 0,4 4 0,-1 0 0,-3 3 0,-1 1 0,1 13 0,0 1 0,1-4 0,1 1 0,-5 8 0,1-1 0,7-13 0,0-1 0,-3 3 0,-1-1 0,2-8 0,0-2 0,2-3 0,-1-1 0,0 0 0,-1 0 0,-1-3 0,1 0 0,2-1 0,0 0 0,-6 1 0,0 0 0,6-4 0,0 0 0,-5 6 0,-2 1 0,3 2 0,1 2 0,0 12 0,-1 2 0,-2 3 0,0 1 0,6 2 0,0-1 0,-6-5 0,0-2 0,6-10 0,0-2 0,-2-3 0,0-3 0,3 42 0,0-44 0,0 2 0,0 2 0,0 2 0,0 7 0,0 3 0,0 1 0,0 1 0,-1 3 0,2-2 0,0-8 0,2-2 0,1 0 0,2-1 0,3-7 0,1-1 0,15 37 0,-11-44 0,1-2 0,14 36 0,1 6 0,5-7 0,4 5 0,8-12 0,-1 6 0,5-1 0,0 2 0,-24-37 0,1-1 0,1 1 0,2 0 0,-2-1 0,1 1 0,0 0 0,0 0 0,-1-4 0,1 0 0,-1 3 0,1 0 0,3-1 0,1-2 0,-4 1 0,1-1 0,6 1 0,0-2 0,20 25 0,0-4 0,-5-13 0,0-6 0,12-4 0,3-6 0,1 0 0,3-4 0,-11-10 0,10 2 0,-5-16 0,13 2 0,4-6 0,-3-6 0,10-17 0,-6-15 0,-28 6 0,1-3 0,-3-1 0,1-2 0,13-8 0,-2-2 0,-11 6 0,-3 0 0,-2 1 0,-5-1 0,17-29 0,-32 24 0,-3-5 0,2-9 0,-2-5 0,4-14 0,-1-5 0,-5 19 0,1-3 0,-2 0 0,-3 1 0,-1-1 0,1 0 0,1 0 0,1 0 0,-2 0 0,0 2 0,-2 0 0,0 2 0,5-24 0,-2 2 0,1 4 0,-3 1 0,-4 0 0,-3 2 0,-3 8 0,-3 2 0,-1-1 0,-2 2 0,-3 5 0,0 1 0,0 3 0,0 1 0,0 1 0,0 1 0,0 0 0,0 0 0,0-3 0,0-1 0,0-6 0,0-2 0,0-2 0,0-1 0,0-4 0,0-1 0,0 1 0,0-1 0,0 0 0,0 1 0,0-1 0,0 1 0,0-1 0,0 0 0,-3-4 0,-2-1 0,0-2 0,-1-1 0,-2 19 0,-2-1 0,1 0-167,0-2 1,-1 1-1,1-2 167,-2-5 0,1-2 0,-1 2 0,1 3 0,1 2 0,-1 1 0,-3-24 0,0 2 0,1 10 0,-1 4 0,1 14 0,-1 0 0,0-6 0,-2-1 0,-4-1 0,0-1 0,4-6 0,0-1 0,-5-2 0,1 0 250,4 9 0,2 1-250,1 5 0,-2 0 0,-1 6 0,0 1 0,3 3 0,-1-1 0,-6-6 0,-1-1 0,3-5 0,-1-1 0,-6-8 0,-1-1 0,7 2 0,1 1 0,-7 3 0,-1 2 0,8 7 0,0 2 0,-2 7 0,0 1 0,1 3 0,0 2 0,-1 2 0,0 1 0,-3-3 0,-1 0 0,0 3 0,0-1 0,-1-6 0,1-1 0,1 8 0,-1 1 0,1-1 0,0 1 0,-17-33 0,0 13 0,9 7 0,-7 11 0,7 6 0,-6 3 0,0 0 0,-1-3 0,-8 0 0,2-2 0,4 2 0,0 1 0,10 0 0,-2 8 0,6 0 0,1 1 0,3 5 0,0-5 0,4 12 0,1-2 0,1 5 0,2-6 0,-5 0 0,-1-2 0,-7-3 0,7 2 0,0 4 0,12 3 0,1 7 0,1 3 0,3 1 0,-2 5 0,1-5 0,0 3 0,-3-2 0,-3-2 0,-1-3 0,-12-2 0,-1-4 0,-12-3 0,7 6 0,0-5 0,6 14 0,5-4 0,-3 5 0,0 0 0,1 2 0,-3-2 0,6 4 0,-2 0 0,6 0 0,-1 0 0,3 0 0,-3 0 0,2 0 0,-7 0 0,5 0 0,-7 0 0,4 0 0,-1 0 0,-3-6 0,-3 5 0,-4-4 0,-1 5 0,-1 0 0,6 0 0,7 0 0,1 0 0,10 0 0,-4 0 0,7 0 0,-5 0 0,3 0 0,-6 0 0,-1 0 0,1 0 0,4 4 0,-1-3 0,5 4 0,-7-4 0,7 1 0,-8 8 0,8-2 0,-6 3 0,5-8 0,-5-3 0,2 0 0,-2 0 0,4 0 0,1 0 0</inkml:trace>
+</inkml:ink>
+</file>
+
 <file path=ppt/notesMasters/notesMaster1.xml><?xml version="1.0" encoding="utf-8"?>
 <p:notesMaster xmlns:a="http://schemas.openxmlformats.org/drawingml/2006/main" xmlns:r="http://schemas.openxmlformats.org/officeDocument/2006/relationships" xmlns:p="http://schemas.openxmlformats.org/presentationml/2006/main">
   <p:cSld>
@@ -16663,6 +16691,33 @@
               <a:t>Archi is also a nice tool.</a:t>
             </a:r>
           </a:p>
+          <a:p>
+            <a:endParaRPr lang="en-US" dirty="0"/>
+          </a:p>
+          <a:p>
+            <a:r>
+              <a:rPr lang="en-US" dirty="0"/>
+              <a:t>There are also complete architecture methods</a:t>
+            </a:r>
+          </a:p>
+          <a:p>
+            <a:r>
+              <a:rPr lang="en-US" dirty="0"/>
+              <a:t>SABSA</a:t>
+            </a:r>
+          </a:p>
+          <a:p>
+            <a:r>
+              <a:rPr lang="en-US" dirty="0"/>
+              <a:t>Zachman - very old and stodgy</a:t>
+            </a:r>
+          </a:p>
+          <a:p>
+            <a:r>
+              <a:rPr lang="en-US" dirty="0"/>
+              <a:t>TOGAF - is not what you think it is</a:t>
+            </a:r>
+          </a:p>
         </p:txBody>
       </p:sp>
       <p:sp>
@@ -16772,15 +16827,6 @@
             <a:endParaRPr lang="en-US" dirty="0"/>
           </a:p>
           <a:p>
-            <a:r>
-              <a:rPr lang="en-US" dirty="0"/>
-              <a:t>Talk about others that may exist. This is just a fly by.</a:t>
-            </a:r>
-          </a:p>
-          <a:p>
-            <a:endParaRPr lang="en-US" dirty="0"/>
-          </a:p>
-          <a:p>
             <a:endParaRPr lang="en-US" dirty="0"/>
           </a:p>
           <a:p>
@@ -17009,10 +17055,7 @@
             <a:endParaRPr lang="en-US" dirty="0"/>
           </a:p>
           <a:p>
-            <a:r>
-              <a:rPr lang="en-US" dirty="0"/>
-              <a:t>This is the beginning of an approach.</a:t>
-            </a:r>
+            <a:endParaRPr lang="en-US" dirty="0"/>
           </a:p>
           <a:p>
             <a:r>
@@ -17149,6 +17192,24 @@
               <a:t>It depends on your audience and needs.</a:t>
             </a:r>
           </a:p>
+          <a:p>
+            <a:endParaRPr lang="en-US" dirty="0"/>
+          </a:p>
+          <a:p>
+            <a:r>
+              <a:rPr lang="en-US" dirty="0"/>
+              <a:t>Your industry</a:t>
+            </a:r>
+          </a:p>
+          <a:p>
+            <a:endParaRPr lang="en-US" dirty="0"/>
+          </a:p>
+          <a:p>
+            <a:r>
+              <a:rPr lang="en-US" dirty="0"/>
+              <a:t>The level of detail</a:t>
+            </a:r>
+          </a:p>
         </p:txBody>
       </p:sp>
       <p:sp>
@@ -17318,18 +17379,6 @@
           <a:bodyPr/>
           <a:lstStyle/>
           <a:p>
-            <a:r>
-              <a:rPr lang="en-US" dirty="0"/>
-              <a:t>We process first</a:t>
-            </a:r>
-          </a:p>
-          <a:p>
-            <a:r>
-              <a:rPr lang="en-US" dirty="0"/>
-              <a:t>The steps</a:t>
-            </a:r>
-          </a:p>
-          <a:p>
             <a:endParaRPr lang="en-US" dirty="0"/>
           </a:p>
           <a:p>
@@ -17339,16 +17388,16 @@
             </a:r>
           </a:p>
           <a:p>
-            <a:endParaRPr lang="en-US" dirty="0"/>
-          </a:p>
-          <a:p>
             <a:r>
               <a:rPr lang="en-US" dirty="0"/>
-              <a:t>You could think about these as activities you do along the way</a:t>
-            </a:r>
-          </a:p>
-          <a:p>
-            <a:endParaRPr lang="en-US" dirty="0"/>
+              <a:t>But notice the progression</a:t>
+            </a:r>
+          </a:p>
+          <a:p>
+            <a:r>
+              <a:rPr lang="en-US" dirty="0"/>
+              <a:t>Discovery - Model - Assess - Change</a:t>
+            </a:r>
           </a:p>
           <a:p>
             <a:r>
@@ -17502,7 +17551,7 @@
           <a:p>
             <a:r>
               <a:rPr lang="en-US" dirty="0"/>
-              <a:t>If the technology does several things or has several functions, note them - this will be common especially for SASE that are security garbage dumps</a:t>
+              <a:t>If the technology does several things or has several functions, note them - this will be common especially for new "tech" like SASE</a:t>
             </a:r>
           </a:p>
         </p:txBody>
@@ -18154,52 +18203,23 @@
           <a:p>
             <a:r>
               <a:rPr lang="en-US" dirty="0"/>
-              <a:t>You </a:t>
-            </a:r>
-            <a:r>
-              <a:rPr lang="en-US" dirty="0" err="1"/>
-              <a:t>dont</a:t>
-            </a:r>
+              <a:t>This is a very simple scale</a:t>
+            </a:r>
+          </a:p>
+          <a:p>
             <a:r>
               <a:rPr lang="en-US" dirty="0"/>
-              <a:t> just have to use a spreadsheet</a:t>
+              <a:t>But it is the easiest to begin with</a:t>
+            </a:r>
+          </a:p>
+          <a:p>
+            <a:r>
+              <a:rPr lang="en-US" dirty="0"/>
+              <a:t>and it works</a:t>
             </a:r>
           </a:p>
           <a:p>
             <a:endParaRPr lang="en-US" dirty="0"/>
-          </a:p>
-          <a:p>
-            <a:r>
-              <a:rPr lang="en-US" dirty="0"/>
-              <a:t>Visually you can mark the capabilities you care about</a:t>
-            </a:r>
-          </a:p>
-          <a:p>
-            <a:endParaRPr lang="en-US" dirty="0"/>
-          </a:p>
-          <a:p>
-            <a:r>
-              <a:rPr lang="en-US" dirty="0"/>
-              <a:t>You can mark the functionality that you have, don’t have and need</a:t>
-            </a:r>
-          </a:p>
-          <a:p>
-            <a:endParaRPr lang="en-US" dirty="0"/>
-          </a:p>
-          <a:p>
-            <a:r>
-              <a:rPr lang="en-US" dirty="0"/>
-              <a:t>It would make for a good wall sized poster</a:t>
-            </a:r>
-          </a:p>
-          <a:p>
-            <a:endParaRPr lang="en-US" dirty="0"/>
-          </a:p>
-          <a:p>
-            <a:r>
-              <a:rPr lang="en-US" dirty="0"/>
-              <a:t>But nothing stays the same</a:t>
-            </a:r>
           </a:p>
         </p:txBody>
       </p:sp>
@@ -18220,7 +18240,7 @@
           <a:p>
             <a:fld id="{B1CAF607-DF55-DC47-B415-DAD88B121D06}" type="slidenum">
               <a:rPr lang="en-US" smtClean="0"/>
-              <a:t>30</a:t>
+              <a:t>29</a:t>
             </a:fld>
             <a:endParaRPr lang="en-US"/>
           </a:p>
@@ -18229,7 +18249,7 @@
     </p:spTree>
     <p:extLst>
       <p:ext uri="{BB962C8B-B14F-4D97-AF65-F5344CB8AC3E}">
-        <p14:creationId xmlns:p14="http://schemas.microsoft.com/office/powerpoint/2010/main" val="2951091680"/>
+        <p14:creationId xmlns:p14="http://schemas.microsoft.com/office/powerpoint/2010/main" val="444457377"/>
       </p:ext>
     </p:extLst>
   </p:cSld>
@@ -18389,30 +18409,33 @@
           <a:p>
             <a:r>
               <a:rPr lang="en-US" dirty="0"/>
-              <a:t>You want to Increase maturity</a:t>
-            </a:r>
-          </a:p>
-          <a:p>
+              <a:t>You </a:t>
+            </a:r>
+            <a:r>
+              <a:rPr lang="en-US" dirty="0" err="1"/>
+              <a:t>dont</a:t>
+            </a:r>
             <a:r>
               <a:rPr lang="en-US" dirty="0"/>
-              <a:t>You have a new New threat and you are adding </a:t>
-            </a:r>
-            <a:r>
-              <a:rPr lang="en-US" dirty="0" err="1"/>
-              <a:t>Zscaler</a:t>
-            </a:r>
+              <a:t> just have to use a spreadsheet</a:t>
+            </a:r>
+          </a:p>
+          <a:p>
             <a:endParaRPr lang="en-US" dirty="0"/>
           </a:p>
           <a:p>
             <a:r>
               <a:rPr lang="en-US" dirty="0"/>
-              <a:t>Change in your business whole new mobile platform to protect</a:t>
-            </a:r>
+              <a:t>Visually you can mark the capabilities you care about</a:t>
+            </a:r>
+          </a:p>
+          <a:p>
+            <a:endParaRPr lang="en-US" dirty="0"/>
           </a:p>
           <a:p>
             <a:r>
               <a:rPr lang="en-US" dirty="0"/>
-              <a:t>Change in services, your outsourced provider just went belly up</a:t>
+              <a:t>You can mark the functionality that you have, don’t have and need</a:t>
             </a:r>
           </a:p>
           <a:p>
@@ -18421,7 +18444,7 @@
           <a:p>
             <a:r>
               <a:rPr lang="en-US" dirty="0"/>
-              <a:t>No longer need fax machine protection</a:t>
+              <a:t>It would make for a good wall sized poster</a:t>
             </a:r>
           </a:p>
           <a:p>
@@ -18430,26 +18453,8 @@
           <a:p>
             <a:r>
               <a:rPr lang="en-US" dirty="0"/>
-              <a:t>Comes down to a couple of choices</a:t>
-            </a:r>
-          </a:p>
-          <a:p>
-            <a:endParaRPr lang="en-US" dirty="0"/>
-          </a:p>
-          <a:p>
-            <a:r>
-              <a:rPr lang="en-US" dirty="0"/>
-              <a:t>Once we have made our changes and updated all our artifacts we can...</a:t>
-            </a:r>
-          </a:p>
-          <a:p>
-            <a:endParaRPr lang="en-US" dirty="0"/>
-          </a:p>
-          <a:p>
-            <a:endParaRPr lang="en-US" dirty="0"/>
-          </a:p>
-          <a:p>
-            <a:endParaRPr lang="en-US" dirty="0"/>
+              <a:t>But nothing stays the same</a:t>
+            </a:r>
           </a:p>
         </p:txBody>
       </p:sp>
@@ -18470,7 +18475,7 @@
           <a:p>
             <a:fld id="{B1CAF607-DF55-DC47-B415-DAD88B121D06}" type="slidenum">
               <a:rPr lang="en-US" smtClean="0"/>
-              <a:t>31</a:t>
+              <a:t>30</a:t>
             </a:fld>
             <a:endParaRPr lang="en-US"/>
           </a:p>
@@ -18479,7 +18484,7 @@
     </p:spTree>
     <p:extLst>
       <p:ext uri="{BB962C8B-B14F-4D97-AF65-F5344CB8AC3E}">
-        <p14:creationId xmlns:p14="http://schemas.microsoft.com/office/powerpoint/2010/main" val="1748277257"/>
+        <p14:creationId xmlns:p14="http://schemas.microsoft.com/office/powerpoint/2010/main" val="2951091680"/>
       </p:ext>
     </p:extLst>
   </p:cSld>
@@ -18535,22 +18540,30 @@
           <a:p>
             <a:r>
               <a:rPr lang="en-US" dirty="0"/>
-              <a:t>Yep </a:t>
+              <a:t>You want to Increase maturity</a:t>
             </a:r>
           </a:p>
           <a:p>
             <a:r>
               <a:rPr lang="en-US" dirty="0"/>
-              <a:t>let it sit or work on it some more</a:t>
-            </a:r>
-          </a:p>
-          <a:p>
+              <a:t>You have a new New threat and you are adding </a:t>
+            </a:r>
+            <a:r>
+              <a:rPr lang="en-US" dirty="0" err="1"/>
+              <a:t>Zscaler</a:t>
+            </a:r>
             <a:endParaRPr lang="en-US" dirty="0"/>
           </a:p>
           <a:p>
             <a:r>
               <a:rPr lang="en-US" dirty="0"/>
-              <a:t>Get more detailed</a:t>
+              <a:t>Change in your business whole new mobile platform to protect</a:t>
+            </a:r>
+          </a:p>
+          <a:p>
+            <a:r>
+              <a:rPr lang="en-US" dirty="0"/>
+              <a:t>Change in services, your outsourced provider just went belly up</a:t>
             </a:r>
           </a:p>
           <a:p>
@@ -18559,8 +18572,35 @@
           <a:p>
             <a:r>
               <a:rPr lang="en-US" dirty="0"/>
-              <a:t>Add more FUNCTIONS</a:t>
-            </a:r>
+              <a:t>No longer need fax machine protection</a:t>
+            </a:r>
+          </a:p>
+          <a:p>
+            <a:endParaRPr lang="en-US" dirty="0"/>
+          </a:p>
+          <a:p>
+            <a:r>
+              <a:rPr lang="en-US" dirty="0"/>
+              <a:t>Comes down to a couple of choices</a:t>
+            </a:r>
+          </a:p>
+          <a:p>
+            <a:endParaRPr lang="en-US" dirty="0"/>
+          </a:p>
+          <a:p>
+            <a:r>
+              <a:rPr lang="en-US" dirty="0"/>
+              <a:t>Once we have made our changes and updated all our artifacts we can...</a:t>
+            </a:r>
+          </a:p>
+          <a:p>
+            <a:endParaRPr lang="en-US" dirty="0"/>
+          </a:p>
+          <a:p>
+            <a:endParaRPr lang="en-US" dirty="0"/>
+          </a:p>
+          <a:p>
+            <a:endParaRPr lang="en-US" dirty="0"/>
           </a:p>
         </p:txBody>
       </p:sp>
@@ -18581,7 +18621,7 @@
           <a:p>
             <a:fld id="{B1CAF607-DF55-DC47-B415-DAD88B121D06}" type="slidenum">
               <a:rPr lang="en-US" smtClean="0"/>
-              <a:t>32</a:t>
+              <a:t>31</a:t>
             </a:fld>
             <a:endParaRPr lang="en-US"/>
           </a:p>
@@ -18590,7 +18630,7 @@
     </p:spTree>
     <p:extLst>
       <p:ext uri="{BB962C8B-B14F-4D97-AF65-F5344CB8AC3E}">
-        <p14:creationId xmlns:p14="http://schemas.microsoft.com/office/powerpoint/2010/main" val="416404408"/>
+        <p14:creationId xmlns:p14="http://schemas.microsoft.com/office/powerpoint/2010/main" val="1748277257"/>
       </p:ext>
     </p:extLst>
   </p:cSld>
@@ -18646,7 +18686,31 @@
           <a:p>
             <a:r>
               <a:rPr lang="en-US" dirty="0"/>
-              <a:t>A little more on visual mapping</a:t>
+              <a:t>Yep </a:t>
+            </a:r>
+          </a:p>
+          <a:p>
+            <a:r>
+              <a:rPr lang="en-US" dirty="0"/>
+              <a:t>let it sit or work on it some more</a:t>
+            </a:r>
+          </a:p>
+          <a:p>
+            <a:endParaRPr lang="en-US" dirty="0"/>
+          </a:p>
+          <a:p>
+            <a:r>
+              <a:rPr lang="en-US" dirty="0"/>
+              <a:t>Get more detailed</a:t>
+            </a:r>
+          </a:p>
+          <a:p>
+            <a:endParaRPr lang="en-US" dirty="0"/>
+          </a:p>
+          <a:p>
+            <a:r>
+              <a:rPr lang="en-US" dirty="0"/>
+              <a:t>Add more FUNCTIONS</a:t>
             </a:r>
           </a:p>
         </p:txBody>
@@ -18668,7 +18732,7 @@
           <a:p>
             <a:fld id="{B1CAF607-DF55-DC47-B415-DAD88B121D06}" type="slidenum">
               <a:rPr lang="en-US" smtClean="0"/>
-              <a:t>33</a:t>
+              <a:t>32</a:t>
             </a:fld>
             <a:endParaRPr lang="en-US"/>
           </a:p>
@@ -18677,7 +18741,7 @@
     </p:spTree>
     <p:extLst>
       <p:ext uri="{BB962C8B-B14F-4D97-AF65-F5344CB8AC3E}">
-        <p14:creationId xmlns:p14="http://schemas.microsoft.com/office/powerpoint/2010/main" val="1664962197"/>
+        <p14:creationId xmlns:p14="http://schemas.microsoft.com/office/powerpoint/2010/main" val="416404408"/>
       </p:ext>
     </p:extLst>
   </p:cSld>
@@ -18733,7 +18797,19 @@
           <a:p>
             <a:r>
               <a:rPr lang="en-US" dirty="0"/>
-              <a:t>You can map the FUNCTIONS to the CSF</a:t>
+              <a:t>A little more on visual mapping</a:t>
+            </a:r>
+          </a:p>
+          <a:p>
+            <a:r>
+              <a:rPr lang="en-US" dirty="0"/>
+              <a:t>To me this is actually the core or heart of the work</a:t>
+            </a:r>
+          </a:p>
+          <a:p>
+            <a:r>
+              <a:rPr lang="en-US" dirty="0"/>
+              <a:t>But it connects from front to back</a:t>
             </a:r>
           </a:p>
         </p:txBody>
@@ -18755,7 +18831,7 @@
           <a:p>
             <a:fld id="{B1CAF607-DF55-DC47-B415-DAD88B121D06}" type="slidenum">
               <a:rPr lang="en-US" smtClean="0"/>
-              <a:t>34</a:t>
+              <a:t>33</a:t>
             </a:fld>
             <a:endParaRPr lang="en-US"/>
           </a:p>
@@ -18764,7 +18840,7 @@
     </p:spTree>
     <p:extLst>
       <p:ext uri="{BB962C8B-B14F-4D97-AF65-F5344CB8AC3E}">
-        <p14:creationId xmlns:p14="http://schemas.microsoft.com/office/powerpoint/2010/main" val="1006017226"/>
+        <p14:creationId xmlns:p14="http://schemas.microsoft.com/office/powerpoint/2010/main" val="1664962197"/>
       </p:ext>
     </p:extLst>
   </p:cSld>
@@ -18820,16 +18896,25 @@
           <a:p>
             <a:r>
               <a:rPr lang="en-US" dirty="0"/>
-              <a:t>Once you do that you can even add the technologies to the labels and have a complete map of</a:t>
-            </a:r>
-          </a:p>
-          <a:p>
-            <a:endParaRPr lang="en-US" dirty="0"/>
+              <a:t>You can map the FUNCTIONS to the CSF</a:t>
+            </a:r>
           </a:p>
           <a:p>
             <a:r>
               <a:rPr lang="en-US" dirty="0"/>
-              <a:t>CAPABILITIES - FUNCTIONS - TECHNOLOGIES - CSF</a:t>
+              <a:t>You may not think much about the CSF </a:t>
+            </a:r>
+          </a:p>
+          <a:p>
+            <a:r>
+              <a:rPr lang="en-US" dirty="0"/>
+              <a:t>But we have a lot of large customers who understand it</a:t>
+            </a:r>
+          </a:p>
+          <a:p>
+            <a:r>
+              <a:rPr lang="en-US" dirty="0"/>
+              <a:t>It is a common understanding</a:t>
             </a:r>
           </a:p>
         </p:txBody>
@@ -18851,7 +18936,7 @@
           <a:p>
             <a:fld id="{B1CAF607-DF55-DC47-B415-DAD88B121D06}" type="slidenum">
               <a:rPr lang="en-US" smtClean="0"/>
-              <a:t>35</a:t>
+              <a:t>34</a:t>
             </a:fld>
             <a:endParaRPr lang="en-US"/>
           </a:p>
@@ -18860,7 +18945,7 @@
     </p:spTree>
     <p:extLst>
       <p:ext uri="{BB962C8B-B14F-4D97-AF65-F5344CB8AC3E}">
-        <p14:creationId xmlns:p14="http://schemas.microsoft.com/office/powerpoint/2010/main" val="4128579812"/>
+        <p14:creationId xmlns:p14="http://schemas.microsoft.com/office/powerpoint/2010/main" val="1006017226"/>
       </p:ext>
     </p:extLst>
   </p:cSld>
@@ -18914,7 +18999,28 @@
           <a:bodyPr/>
           <a:lstStyle/>
           <a:p>
+            <a:r>
+              <a:rPr lang="en-US" dirty="0"/>
+              <a:t>Once you do that you can even add the technologies to the labels and have a complete map of</a:t>
+            </a:r>
+          </a:p>
+          <a:p>
             <a:endParaRPr lang="en-US" dirty="0"/>
+          </a:p>
+          <a:p>
+            <a:r>
+              <a:rPr lang="en-US" dirty="0"/>
+              <a:t>The more specific the functions are the less overlap you will have</a:t>
+            </a:r>
+          </a:p>
+          <a:p>
+            <a:endParaRPr lang="en-US" dirty="0"/>
+          </a:p>
+          <a:p>
+            <a:r>
+              <a:rPr lang="en-US" dirty="0"/>
+              <a:t>CAPABILITIES - FUNCTIONS - TECHNOLOGIES - CSF</a:t>
+            </a:r>
           </a:p>
         </p:txBody>
       </p:sp>
@@ -18935,7 +19041,7 @@
           <a:p>
             <a:fld id="{B1CAF607-DF55-DC47-B415-DAD88B121D06}" type="slidenum">
               <a:rPr lang="en-US" smtClean="0"/>
-              <a:t>37</a:t>
+              <a:t>35</a:t>
             </a:fld>
             <a:endParaRPr lang="en-US"/>
           </a:p>
@@ -18944,7 +19050,7 @@
     </p:spTree>
     <p:extLst>
       <p:ext uri="{BB962C8B-B14F-4D97-AF65-F5344CB8AC3E}">
-        <p14:creationId xmlns:p14="http://schemas.microsoft.com/office/powerpoint/2010/main" val="1135666183"/>
+        <p14:creationId xmlns:p14="http://schemas.microsoft.com/office/powerpoint/2010/main" val="4128579812"/>
       </p:ext>
     </p:extLst>
   </p:cSld>
@@ -19000,35 +19106,53 @@
           <a:p>
             <a:r>
               <a:rPr lang="en-US" dirty="0"/>
-              <a:t>This is not an end all be all</a:t>
+              <a:t>You can also place the security FUNCTIONS</a:t>
             </a:r>
           </a:p>
           <a:p>
             <a:r>
               <a:rPr lang="en-US" dirty="0"/>
-              <a:t>This is just a foundation for you to use</a:t>
+              <a:t>To show people where you expect security to be applied</a:t>
             </a:r>
           </a:p>
           <a:p>
             <a:r>
               <a:rPr lang="en-US" dirty="0"/>
-              <a:t>Add more data points</a:t>
-            </a:r>
+              <a:t>You could even express these as controls</a:t>
+            </a:r>
+          </a:p>
+          <a:p>
+            <a:endParaRPr lang="en-US" dirty="0"/>
           </a:p>
           <a:p>
             <a:r>
               <a:rPr lang="en-US" dirty="0"/>
-              <a:t>Draw more diagrams</a:t>
+              <a:t>Typical cloud setup</a:t>
             </a:r>
           </a:p>
           <a:p>
             <a:r>
               <a:rPr lang="en-US" dirty="0"/>
-              <a:t>Change your diagrams to models </a:t>
+              <a:t>Here is what you expect</a:t>
             </a:r>
           </a:p>
           <a:p>
             <a:endParaRPr lang="en-US" dirty="0"/>
+          </a:p>
+          <a:p>
+            <a:r>
+              <a:rPr lang="en-US" dirty="0"/>
+              <a:t>Notice the two items in BLUE we don’t have FUNCTIONs for those in our model</a:t>
+            </a:r>
+          </a:p>
+          <a:p>
+            <a:endParaRPr lang="en-US" dirty="0"/>
+          </a:p>
+          <a:p>
+            <a:r>
+              <a:rPr lang="en-US" dirty="0"/>
+              <a:t>Model needs updated to match what we need or know about</a:t>
+            </a:r>
           </a:p>
           <a:p>
             <a:endParaRPr lang="en-US" dirty="0"/>
@@ -19052,6 +19176,264 @@
           <a:p>
             <a:fld id="{B1CAF607-DF55-DC47-B415-DAD88B121D06}" type="slidenum">
               <a:rPr lang="en-US" smtClean="0"/>
+              <a:t>36</a:t>
+            </a:fld>
+            <a:endParaRPr lang="en-US"/>
+          </a:p>
+        </p:txBody>
+      </p:sp>
+    </p:spTree>
+    <p:extLst>
+      <p:ext uri="{BB962C8B-B14F-4D97-AF65-F5344CB8AC3E}">
+        <p14:creationId xmlns:p14="http://schemas.microsoft.com/office/powerpoint/2010/main" val="2257074108"/>
+      </p:ext>
+    </p:extLst>
+  </p:cSld>
+  <p:clrMapOvr>
+    <a:masterClrMapping/>
+  </p:clrMapOvr>
+</p:notes>
+</file>
+
+<file path=ppt/notesSlides/notesSlide37.xml><?xml version="1.0" encoding="utf-8"?>
+<p:notes xmlns:a="http://schemas.openxmlformats.org/drawingml/2006/main" xmlns:r="http://schemas.openxmlformats.org/officeDocument/2006/relationships" xmlns:p="http://schemas.openxmlformats.org/presentationml/2006/main">
+  <p:cSld>
+    <p:spTree>
+      <p:nvGrpSpPr>
+        <p:cNvPr id="1" name=""/>
+        <p:cNvGrpSpPr/>
+        <p:nvPr/>
+      </p:nvGrpSpPr>
+      <p:grpSpPr>
+        <a:xfrm>
+          <a:off x="0" y="0"/>
+          <a:ext cx="0" cy="0"/>
+          <a:chOff x="0" y="0"/>
+          <a:chExt cx="0" cy="0"/>
+        </a:xfrm>
+      </p:grpSpPr>
+      <p:sp>
+        <p:nvSpPr>
+          <p:cNvPr id="2" name="Slide Image Placeholder 1"/>
+          <p:cNvSpPr>
+            <a:spLocks noGrp="1" noRot="1" noChangeAspect="1"/>
+          </p:cNvSpPr>
+          <p:nvPr>
+            <p:ph type="sldImg"/>
+          </p:nvPr>
+        </p:nvSpPr>
+        <p:spPr/>
+      </p:sp>
+      <p:sp>
+        <p:nvSpPr>
+          <p:cNvPr id="3" name="Notes Placeholder 2"/>
+          <p:cNvSpPr>
+            <a:spLocks noGrp="1"/>
+          </p:cNvSpPr>
+          <p:nvPr>
+            <p:ph type="body" idx="1"/>
+          </p:nvPr>
+        </p:nvSpPr>
+        <p:spPr/>
+        <p:txBody>
+          <a:bodyPr/>
+          <a:lstStyle/>
+          <a:p>
+            <a:r>
+              <a:rPr lang="en-US" dirty="0"/>
+              <a:t>Place that is a simple AWS Context</a:t>
+            </a:r>
+          </a:p>
+          <a:p>
+            <a:endParaRPr lang="en-US" dirty="0"/>
+          </a:p>
+          <a:p>
+            <a:r>
+              <a:rPr lang="en-US" dirty="0"/>
+              <a:t>We can see what technologies are being used where</a:t>
+            </a:r>
+          </a:p>
+          <a:p>
+            <a:r>
+              <a:rPr lang="en-US" dirty="0"/>
+              <a:t>Also are these on your MATRIX?</a:t>
+            </a:r>
+          </a:p>
+          <a:p>
+            <a:endParaRPr lang="en-US" dirty="0"/>
+          </a:p>
+          <a:p>
+            <a:r>
+              <a:rPr lang="en-US" dirty="0"/>
+              <a:t>Also notice we don’t have a DLP solution yet although we should have one</a:t>
+            </a:r>
+          </a:p>
+          <a:p>
+            <a:r>
+              <a:rPr lang="en-US" dirty="0"/>
+              <a:t>And is Guard Duty good enough.?</a:t>
+            </a:r>
+          </a:p>
+          <a:p>
+            <a:endParaRPr lang="en-US" dirty="0"/>
+          </a:p>
+          <a:p>
+            <a:r>
+              <a:rPr lang="en-US" dirty="0"/>
+              <a:t>The next level is to build out a Reference Architecture</a:t>
+            </a:r>
+          </a:p>
+          <a:p>
+            <a:r>
+              <a:rPr lang="en-US" dirty="0"/>
+              <a:t>When you add more lines and boxes</a:t>
+            </a:r>
+          </a:p>
+          <a:p>
+            <a:endParaRPr lang="en-US" dirty="0"/>
+          </a:p>
+          <a:p>
+            <a:r>
+              <a:rPr lang="en-US" dirty="0"/>
+              <a:t>SO</a:t>
+            </a:r>
+          </a:p>
+        </p:txBody>
+      </p:sp>
+      <p:sp>
+        <p:nvSpPr>
+          <p:cNvPr id="4" name="Slide Number Placeholder 3"/>
+          <p:cNvSpPr>
+            <a:spLocks noGrp="1"/>
+          </p:cNvSpPr>
+          <p:nvPr>
+            <p:ph type="sldNum" sz="quarter" idx="5"/>
+          </p:nvPr>
+        </p:nvSpPr>
+        <p:spPr/>
+        <p:txBody>
+          <a:bodyPr/>
+          <a:lstStyle/>
+          <a:p>
+            <a:fld id="{B1CAF607-DF55-DC47-B415-DAD88B121D06}" type="slidenum">
+              <a:rPr lang="en-US" smtClean="0"/>
+              <a:t>37</a:t>
+            </a:fld>
+            <a:endParaRPr lang="en-US"/>
+          </a:p>
+        </p:txBody>
+      </p:sp>
+    </p:spTree>
+    <p:extLst>
+      <p:ext uri="{BB962C8B-B14F-4D97-AF65-F5344CB8AC3E}">
+        <p14:creationId xmlns:p14="http://schemas.microsoft.com/office/powerpoint/2010/main" val="1135666183"/>
+      </p:ext>
+    </p:extLst>
+  </p:cSld>
+  <p:clrMapOvr>
+    <a:masterClrMapping/>
+  </p:clrMapOvr>
+</p:notes>
+</file>
+
+<file path=ppt/notesSlides/notesSlide38.xml><?xml version="1.0" encoding="utf-8"?>
+<p:notes xmlns:a="http://schemas.openxmlformats.org/drawingml/2006/main" xmlns:r="http://schemas.openxmlformats.org/officeDocument/2006/relationships" xmlns:p="http://schemas.openxmlformats.org/presentationml/2006/main">
+  <p:cSld>
+    <p:spTree>
+      <p:nvGrpSpPr>
+        <p:cNvPr id="1" name=""/>
+        <p:cNvGrpSpPr/>
+        <p:nvPr/>
+      </p:nvGrpSpPr>
+      <p:grpSpPr>
+        <a:xfrm>
+          <a:off x="0" y="0"/>
+          <a:ext cx="0" cy="0"/>
+          <a:chOff x="0" y="0"/>
+          <a:chExt cx="0" cy="0"/>
+        </a:xfrm>
+      </p:grpSpPr>
+      <p:sp>
+        <p:nvSpPr>
+          <p:cNvPr id="2" name="Slide Image Placeholder 1"/>
+          <p:cNvSpPr>
+            <a:spLocks noGrp="1" noRot="1" noChangeAspect="1"/>
+          </p:cNvSpPr>
+          <p:nvPr>
+            <p:ph type="sldImg"/>
+          </p:nvPr>
+        </p:nvSpPr>
+        <p:spPr/>
+      </p:sp>
+      <p:sp>
+        <p:nvSpPr>
+          <p:cNvPr id="3" name="Notes Placeholder 2"/>
+          <p:cNvSpPr>
+            <a:spLocks noGrp="1"/>
+          </p:cNvSpPr>
+          <p:nvPr>
+            <p:ph type="body" idx="1"/>
+          </p:nvPr>
+        </p:nvSpPr>
+        <p:spPr/>
+        <p:txBody>
+          <a:bodyPr/>
+          <a:lstStyle/>
+          <a:p>
+            <a:r>
+              <a:rPr lang="en-US" dirty="0"/>
+              <a:t>This is not an end all be all</a:t>
+            </a:r>
+          </a:p>
+          <a:p>
+            <a:r>
+              <a:rPr lang="en-US" dirty="0"/>
+              <a:t>This is just a foundation for you to use</a:t>
+            </a:r>
+          </a:p>
+          <a:p>
+            <a:r>
+              <a:rPr lang="en-US" dirty="0"/>
+              <a:t>Add more data points</a:t>
+            </a:r>
+          </a:p>
+          <a:p>
+            <a:r>
+              <a:rPr lang="en-US" dirty="0"/>
+              <a:t>Draw more diagrams</a:t>
+            </a:r>
+          </a:p>
+          <a:p>
+            <a:r>
+              <a:rPr lang="en-US" dirty="0"/>
+              <a:t>Change your diagrams to models </a:t>
+            </a:r>
+          </a:p>
+          <a:p>
+            <a:endParaRPr lang="en-US" dirty="0"/>
+          </a:p>
+          <a:p>
+            <a:endParaRPr lang="en-US" dirty="0"/>
+          </a:p>
+        </p:txBody>
+      </p:sp>
+      <p:sp>
+        <p:nvSpPr>
+          <p:cNvPr id="4" name="Slide Number Placeholder 3"/>
+          <p:cNvSpPr>
+            <a:spLocks noGrp="1"/>
+          </p:cNvSpPr>
+          <p:nvPr>
+            <p:ph type="sldNum" sz="quarter" idx="5"/>
+          </p:nvPr>
+        </p:nvSpPr>
+        <p:spPr/>
+        <p:txBody>
+          <a:bodyPr/>
+          <a:lstStyle/>
+          <a:p>
+            <a:fld id="{B1CAF607-DF55-DC47-B415-DAD88B121D06}" type="slidenum">
+              <a:rPr lang="en-US" smtClean="0"/>
               <a:t>40</a:t>
             </a:fld>
             <a:endParaRPr lang="en-US"/>
@@ -19071,7 +19453,7 @@
 </p:notes>
 </file>
 
-<file path=ppt/notesSlides/notesSlide37.xml><?xml version="1.0" encoding="utf-8"?>
+<file path=ppt/notesSlides/notesSlide39.xml><?xml version="1.0" encoding="utf-8"?>
 <p:notes xmlns:a="http://schemas.openxmlformats.org/drawingml/2006/main" xmlns:r="http://schemas.openxmlformats.org/officeDocument/2006/relationships" xmlns:p="http://schemas.openxmlformats.org/presentationml/2006/main">
   <p:cSld>
     <p:spTree>
@@ -19355,6 +19737,15 @@
             <a:r>
               <a:rPr lang="en-US" dirty="0"/>
               <a:t>The more you back up what you say the more people will listen to you.</a:t>
+            </a:r>
+          </a:p>
+          <a:p>
+            <a:endParaRPr lang="en-US" dirty="0"/>
+          </a:p>
+          <a:p>
+            <a:r>
+              <a:rPr lang="en-US" dirty="0"/>
+              <a:t>YOU HAVE TO START SOMEWHERE</a:t>
             </a:r>
           </a:p>
         </p:txBody>
@@ -29869,13 +30260,13 @@
           <p:nvPr>
             <p:extLst>
               <p:ext uri="{D42A27DB-BD31-4B8C-83A1-F6EECF244321}">
-                <p14:modId xmlns:p14="http://schemas.microsoft.com/office/powerpoint/2010/main" val="3276039788"/>
+                <p14:modId xmlns:p14="http://schemas.microsoft.com/office/powerpoint/2010/main" val="2730200589"/>
               </p:ext>
             </p:extLst>
           </p:nvPr>
         </p:nvGraphicFramePr>
         <p:xfrm>
-          <a:off x="2032000" y="1138933"/>
+          <a:off x="3738484" y="1096480"/>
           <a:ext cx="8128000" cy="5418667"/>
         </p:xfrm>
         <a:graphic>
@@ -29884,6 +30275,364 @@
           </a:graphicData>
         </a:graphic>
       </p:graphicFrame>
+      <p:sp>
+        <p:nvSpPr>
+          <p:cNvPr id="5" name="Rectangle 4">
+            <a:extLst>
+              <a:ext uri="{FF2B5EF4-FFF2-40B4-BE49-F238E27FC236}">
+                <a16:creationId xmlns:a16="http://schemas.microsoft.com/office/drawing/2014/main" id="{A6E910D0-7445-2345-9954-15D40CF6EDAF}"/>
+              </a:ext>
+            </a:extLst>
+          </p:cNvPr>
+          <p:cNvSpPr/>
+          <p:nvPr/>
+        </p:nvSpPr>
+        <p:spPr>
+          <a:xfrm>
+            <a:off x="325516" y="1138933"/>
+            <a:ext cx="2138548" cy="1143000"/>
+          </a:xfrm>
+          <a:prstGeom prst="rect">
+            <a:avLst/>
+          </a:prstGeom>
+          <a:solidFill>
+            <a:schemeClr val="accent6">
+              <a:lumMod val="50000"/>
+            </a:schemeClr>
+          </a:solidFill>
+          <a:ln>
+            <a:solidFill>
+              <a:schemeClr val="accent6">
+                <a:lumMod val="50000"/>
+              </a:schemeClr>
+            </a:solidFill>
+          </a:ln>
+        </p:spPr>
+        <p:style>
+          <a:lnRef idx="2">
+            <a:schemeClr val="accent1">
+              <a:shade val="50000"/>
+            </a:schemeClr>
+          </a:lnRef>
+          <a:fillRef idx="1">
+            <a:schemeClr val="accent1"/>
+          </a:fillRef>
+          <a:effectRef idx="0">
+            <a:schemeClr val="accent1"/>
+          </a:effectRef>
+          <a:fontRef idx="minor">
+            <a:schemeClr val="lt1"/>
+          </a:fontRef>
+        </p:style>
+        <p:txBody>
+          <a:bodyPr rtlCol="0" anchor="ctr"/>
+          <a:lstStyle/>
+          <a:p>
+            <a:pPr algn="ctr"/>
+            <a:r>
+              <a:rPr lang="en-US" sz="2400" dirty="0">
+                <a:solidFill>
+                  <a:schemeClr val="bg1"/>
+                </a:solidFill>
+                <a:latin typeface="Palatino" pitchFamily="2" charset="77"/>
+                <a:ea typeface="Palatino" pitchFamily="2" charset="77"/>
+              </a:rPr>
+              <a:t>Capability</a:t>
+            </a:r>
+          </a:p>
+        </p:txBody>
+      </p:sp>
+      <p:sp>
+        <p:nvSpPr>
+          <p:cNvPr id="6" name="Rectangle 5">
+            <a:extLst>
+              <a:ext uri="{FF2B5EF4-FFF2-40B4-BE49-F238E27FC236}">
+                <a16:creationId xmlns:a16="http://schemas.microsoft.com/office/drawing/2014/main" id="{A50570A7-C603-3A44-BB6C-7181FD524E53}"/>
+              </a:ext>
+            </a:extLst>
+          </p:cNvPr>
+          <p:cNvSpPr/>
+          <p:nvPr/>
+        </p:nvSpPr>
+        <p:spPr>
+          <a:xfrm>
+            <a:off x="325516" y="2853433"/>
+            <a:ext cx="2138548" cy="1143000"/>
+          </a:xfrm>
+          <a:prstGeom prst="rect">
+            <a:avLst/>
+          </a:prstGeom>
+          <a:solidFill>
+            <a:schemeClr val="accent6">
+              <a:lumMod val="60000"/>
+              <a:lumOff val="40000"/>
+            </a:schemeClr>
+          </a:solidFill>
+          <a:ln>
+            <a:solidFill>
+              <a:schemeClr val="bg1"/>
+            </a:solidFill>
+          </a:ln>
+        </p:spPr>
+        <p:style>
+          <a:lnRef idx="2">
+            <a:schemeClr val="accent1">
+              <a:shade val="50000"/>
+            </a:schemeClr>
+          </a:lnRef>
+          <a:fillRef idx="1">
+            <a:schemeClr val="accent1"/>
+          </a:fillRef>
+          <a:effectRef idx="0">
+            <a:schemeClr val="accent1"/>
+          </a:effectRef>
+          <a:fontRef idx="minor">
+            <a:schemeClr val="lt1"/>
+          </a:fontRef>
+        </p:style>
+        <p:txBody>
+          <a:bodyPr rtlCol="0" anchor="ctr"/>
+          <a:lstStyle/>
+          <a:p>
+            <a:pPr algn="ctr"/>
+            <a:r>
+              <a:rPr lang="en-US" sz="2400" dirty="0">
+                <a:solidFill>
+                  <a:schemeClr val="accent6">
+                    <a:lumMod val="50000"/>
+                  </a:schemeClr>
+                </a:solidFill>
+                <a:latin typeface="Palatino" pitchFamily="2" charset="77"/>
+                <a:ea typeface="Palatino" pitchFamily="2" charset="77"/>
+              </a:rPr>
+              <a:t>Service or Function</a:t>
+            </a:r>
+          </a:p>
+        </p:txBody>
+      </p:sp>
+      <p:sp>
+        <p:nvSpPr>
+          <p:cNvPr id="7" name="Rectangle 6">
+            <a:extLst>
+              <a:ext uri="{FF2B5EF4-FFF2-40B4-BE49-F238E27FC236}">
+                <a16:creationId xmlns:a16="http://schemas.microsoft.com/office/drawing/2014/main" id="{0D815A03-CE78-E64F-A7AB-C0C994BFD7B2}"/>
+              </a:ext>
+            </a:extLst>
+          </p:cNvPr>
+          <p:cNvSpPr/>
+          <p:nvPr/>
+        </p:nvSpPr>
+        <p:spPr>
+          <a:xfrm>
+            <a:off x="325516" y="4567933"/>
+            <a:ext cx="2138548" cy="1143000"/>
+          </a:xfrm>
+          <a:prstGeom prst="rect">
+            <a:avLst/>
+          </a:prstGeom>
+          <a:solidFill>
+            <a:schemeClr val="accent6">
+              <a:lumMod val="20000"/>
+              <a:lumOff val="80000"/>
+            </a:schemeClr>
+          </a:solidFill>
+          <a:ln>
+            <a:solidFill>
+              <a:schemeClr val="bg1"/>
+            </a:solidFill>
+          </a:ln>
+        </p:spPr>
+        <p:style>
+          <a:lnRef idx="2">
+            <a:schemeClr val="accent1">
+              <a:shade val="50000"/>
+            </a:schemeClr>
+          </a:lnRef>
+          <a:fillRef idx="1">
+            <a:schemeClr val="accent1"/>
+          </a:fillRef>
+          <a:effectRef idx="0">
+            <a:schemeClr val="accent1"/>
+          </a:effectRef>
+          <a:fontRef idx="minor">
+            <a:schemeClr val="lt1"/>
+          </a:fontRef>
+        </p:style>
+        <p:txBody>
+          <a:bodyPr rtlCol="0" anchor="ctr"/>
+          <a:lstStyle/>
+          <a:p>
+            <a:pPr algn="ctr"/>
+            <a:r>
+              <a:rPr lang="en-US" sz="2400" dirty="0">
+                <a:solidFill>
+                  <a:schemeClr val="accent6">
+                    <a:lumMod val="50000"/>
+                  </a:schemeClr>
+                </a:solidFill>
+                <a:latin typeface="Palatino" pitchFamily="2" charset="77"/>
+                <a:ea typeface="Palatino" pitchFamily="2" charset="77"/>
+              </a:rPr>
+              <a:t>People, Process, Technology</a:t>
+            </a:r>
+          </a:p>
+        </p:txBody>
+      </p:sp>
+      <p:cxnSp>
+        <p:nvCxnSpPr>
+          <p:cNvPr id="8" name="Straight Connector 7">
+            <a:extLst>
+              <a:ext uri="{FF2B5EF4-FFF2-40B4-BE49-F238E27FC236}">
+                <a16:creationId xmlns:a16="http://schemas.microsoft.com/office/drawing/2014/main" id="{E2C8EC5F-BA65-D943-8EAB-50C79D36FD43}"/>
+              </a:ext>
+            </a:extLst>
+          </p:cNvPr>
+          <p:cNvCxnSpPr>
+            <a:cxnSpLocks/>
+            <a:endCxn id="6" idx="0"/>
+          </p:cNvCxnSpPr>
+          <p:nvPr/>
+        </p:nvCxnSpPr>
+        <p:spPr>
+          <a:xfrm>
+            <a:off x="1394790" y="2281933"/>
+            <a:ext cx="0" cy="571500"/>
+          </a:xfrm>
+          <a:prstGeom prst="line">
+            <a:avLst/>
+          </a:prstGeom>
+          <a:ln w="38100">
+            <a:solidFill>
+              <a:schemeClr val="accent6">
+                <a:lumMod val="60000"/>
+                <a:lumOff val="40000"/>
+              </a:schemeClr>
+            </a:solidFill>
+          </a:ln>
+        </p:spPr>
+        <p:style>
+          <a:lnRef idx="1">
+            <a:schemeClr val="accent1"/>
+          </a:lnRef>
+          <a:fillRef idx="0">
+            <a:schemeClr val="accent1"/>
+          </a:fillRef>
+          <a:effectRef idx="0">
+            <a:schemeClr val="accent1"/>
+          </a:effectRef>
+          <a:fontRef idx="minor">
+            <a:schemeClr val="tx1"/>
+          </a:fontRef>
+        </p:style>
+      </p:cxnSp>
+      <p:cxnSp>
+        <p:nvCxnSpPr>
+          <p:cNvPr id="9" name="Straight Connector 8">
+            <a:extLst>
+              <a:ext uri="{FF2B5EF4-FFF2-40B4-BE49-F238E27FC236}">
+                <a16:creationId xmlns:a16="http://schemas.microsoft.com/office/drawing/2014/main" id="{D5C8C1CB-AE0E-9743-B544-E3AC1DC75E7F}"/>
+              </a:ext>
+            </a:extLst>
+          </p:cNvPr>
+          <p:cNvCxnSpPr>
+            <a:cxnSpLocks/>
+            <a:stCxn id="6" idx="2"/>
+            <a:endCxn id="7" idx="0"/>
+          </p:cNvCxnSpPr>
+          <p:nvPr/>
+        </p:nvCxnSpPr>
+        <p:spPr>
+          <a:xfrm>
+            <a:off x="1394790" y="3996433"/>
+            <a:ext cx="0" cy="571500"/>
+          </a:xfrm>
+          <a:prstGeom prst="line">
+            <a:avLst/>
+          </a:prstGeom>
+          <a:ln w="38100">
+            <a:solidFill>
+              <a:schemeClr val="accent6">
+                <a:lumMod val="40000"/>
+                <a:lumOff val="60000"/>
+              </a:schemeClr>
+            </a:solidFill>
+          </a:ln>
+        </p:spPr>
+        <p:style>
+          <a:lnRef idx="1">
+            <a:schemeClr val="accent1"/>
+          </a:lnRef>
+          <a:fillRef idx="0">
+            <a:schemeClr val="accent1"/>
+          </a:fillRef>
+          <a:effectRef idx="0">
+            <a:schemeClr val="accent1"/>
+          </a:effectRef>
+          <a:fontRef idx="minor">
+            <a:schemeClr val="tx1"/>
+          </a:fontRef>
+        </p:style>
+      </p:cxnSp>
+      <p:sp>
+        <p:nvSpPr>
+          <p:cNvPr id="10" name="Right Arrow 9">
+            <a:extLst>
+              <a:ext uri="{FF2B5EF4-FFF2-40B4-BE49-F238E27FC236}">
+                <a16:creationId xmlns:a16="http://schemas.microsoft.com/office/drawing/2014/main" id="{2E65C6F1-2539-1A4D-B978-8C55A2D88030}"/>
+              </a:ext>
+            </a:extLst>
+          </p:cNvPr>
+          <p:cNvSpPr/>
+          <p:nvPr/>
+        </p:nvSpPr>
+        <p:spPr>
+          <a:xfrm>
+            <a:off x="2674766" y="1240743"/>
+            <a:ext cx="1185358" cy="939380"/>
+          </a:xfrm>
+          <a:prstGeom prst="rightArrow">
+            <a:avLst/>
+          </a:prstGeom>
+          <a:solidFill>
+            <a:schemeClr val="accent6">
+              <a:lumMod val="60000"/>
+              <a:lumOff val="40000"/>
+            </a:schemeClr>
+          </a:solidFill>
+          <a:ln>
+            <a:solidFill>
+              <a:schemeClr val="accent6">
+                <a:lumMod val="60000"/>
+                <a:lumOff val="40000"/>
+              </a:schemeClr>
+            </a:solidFill>
+          </a:ln>
+        </p:spPr>
+        <p:style>
+          <a:lnRef idx="2">
+            <a:schemeClr val="accent1">
+              <a:shade val="50000"/>
+            </a:schemeClr>
+          </a:lnRef>
+          <a:fillRef idx="1">
+            <a:schemeClr val="accent1"/>
+          </a:fillRef>
+          <a:effectRef idx="0">
+            <a:schemeClr val="accent1"/>
+          </a:effectRef>
+          <a:fontRef idx="minor">
+            <a:schemeClr val="lt1"/>
+          </a:fontRef>
+        </p:style>
+        <p:txBody>
+          <a:bodyPr rtlCol="0" anchor="ctr"/>
+          <a:lstStyle/>
+          <a:p>
+            <a:pPr algn="ctr"/>
+            <a:endParaRPr lang="en-US"/>
+          </a:p>
+        </p:txBody>
+      </p:sp>
     </p:spTree>
     <p:extLst>
       <p:ext uri="{BB962C8B-B14F-4D97-AF65-F5344CB8AC3E}">
@@ -32286,6 +33035,57 @@
           </a:prstGeom>
         </p:spPr>
       </p:pic>
+      <mc:AlternateContent xmlns:mc="http://schemas.openxmlformats.org/markup-compatibility/2006">
+        <mc:Choice xmlns:p14="http://schemas.microsoft.com/office/powerpoint/2010/main" Requires="p14">
+          <p:contentPart p14:bwMode="auto" r:id="rId4">
+            <p14:nvContentPartPr>
+              <p14:cNvPr id="4" name="Ink 3">
+                <a:extLst>
+                  <a:ext uri="{FF2B5EF4-FFF2-40B4-BE49-F238E27FC236}">
+                    <a16:creationId xmlns:a16="http://schemas.microsoft.com/office/drawing/2014/main" id="{49CDB863-2DDA-8C4C-9D70-A90DE1E702B2}"/>
+                  </a:ext>
+                </a:extLst>
+              </p14:cNvPr>
+              <p14:cNvContentPartPr/>
+              <p14:nvPr/>
+            </p14:nvContentPartPr>
+            <p14:xfrm>
+              <a:off x="5787785" y="454909"/>
+              <a:ext cx="1161720" cy="3772800"/>
+            </p14:xfrm>
+          </p:contentPart>
+        </mc:Choice>
+        <mc:Fallback>
+          <p:pic>
+            <p:nvPicPr>
+              <p:cNvPr id="4" name="Ink 3">
+                <a:extLst>
+                  <a:ext uri="{FF2B5EF4-FFF2-40B4-BE49-F238E27FC236}">
+                    <a16:creationId xmlns:a16="http://schemas.microsoft.com/office/drawing/2014/main" id="{49CDB863-2DDA-8C4C-9D70-A90DE1E702B2}"/>
+                  </a:ext>
+                </a:extLst>
+              </p:cNvPr>
+              <p:cNvPicPr/>
+              <p:nvPr/>
+            </p:nvPicPr>
+            <p:blipFill>
+              <a:blip r:embed="rId5"/>
+              <a:stretch>
+                <a:fillRect/>
+              </a:stretch>
+            </p:blipFill>
+            <p:spPr>
+              <a:xfrm>
+                <a:off x="5769785" y="436909"/>
+                <a:ext cx="1197360" cy="3808440"/>
+              </a:xfrm>
+              <a:prstGeom prst="rect">
+                <a:avLst/>
+              </a:prstGeom>
+            </p:spPr>
+          </p:pic>
+        </mc:Fallback>
+      </mc:AlternateContent>
     </p:spTree>
     <p:extLst>
       <p:ext uri="{BB962C8B-B14F-4D97-AF65-F5344CB8AC3E}">
@@ -32669,7 +33469,7 @@
           <p:nvPr/>
         </p:nvPicPr>
         <p:blipFill>
-          <a:blip r:embed="rId2"/>
+          <a:blip r:embed="rId3"/>
           <a:stretch>
             <a:fillRect/>
           </a:stretch>
@@ -35445,7 +36245,7 @@
           <p:nvPr/>
         </p:nvPicPr>
         <p:blipFill>
-          <a:blip r:embed="rId2">
+          <a:blip r:embed="rId3">
             <a:extLst>
               <a:ext uri="{28A0092B-C50C-407E-A947-70E740481C1C}">
                 <a14:useLocalDpi xmlns:a14="http://schemas.microsoft.com/office/drawing/2010/main" val="0"/>

</xml_diff>